<commit_message>
Add web server recommendations to diagram
</commit_message>
<xml_diff>
--- a/Getting Started with ASP.NET 5 in VS Code - RC1.pptx
+++ b/Getting Started with ASP.NET 5 in VS Code - RC1.pptx
@@ -127,7 +127,7 @@
   </p:defaultTextStyle>
   <p:extLst>
     <p:ext uri="{EFAFB233-063F-42B5-8137-9DF3F51BA10A}">
-      <p15:sldGuideLst xmlns:p15="http://schemas.microsoft.com/office/powerpoint/2012/main">
+      <p15:sldGuideLst xmlns:p15="http://schemas.microsoft.com/office/powerpoint/2012/main" xmlns="">
         <p15:guide id="1" orient="horz" pos="2160" userDrawn="1">
           <p15:clr>
             <a:srgbClr val="A4A3A4"/>
@@ -2438,14 +2438,14 @@
         <a:p>
           <a:pPr algn="ctr"/>
           <a:r>
-            <a:rPr lang="en-US" dirty="0" smtClean="0">
+            <a:rPr lang="en-US" b="1" dirty="0" smtClean="0">
               <a:solidFill>
                 <a:schemeClr val="bg1"/>
               </a:solidFill>
             </a:rPr>
             <a:t>DNX</a:t>
           </a:r>
-          <a:endParaRPr lang="en-US" dirty="0">
+          <a:endParaRPr lang="en-US" b="1" dirty="0">
             <a:solidFill>
               <a:schemeClr val="bg1"/>
             </a:solidFill>
@@ -2462,7 +2462,11 @@
         <a:p>
           <a:r>
             <a:rPr lang="en-US" dirty="0" smtClean="0"/>
-            <a:t>Full .NET Framework</a:t>
+            <a:t>.</a:t>
+          </a:r>
+          <a:r>
+            <a:rPr lang="en-US" dirty="0" smtClean="0"/>
+            <a:t>NET Framework</a:t>
           </a:r>
           <a:endParaRPr lang="en-US" dirty="0"/>
         </a:p>
@@ -2470,7 +2474,9 @@
     </dgm:pt>
     <dgm:pt modelId="{523E3F81-A7FD-41C6-AEFA-00BFD2D5C126}" type="parTrans" cxnId="{9ED1ECAC-6869-4938-B949-03E4C47B439C}">
       <dgm:prSet/>
-      <dgm:spPr/>
+      <dgm:spPr>
+        <a:ln w="25400"/>
+      </dgm:spPr>
       <dgm:t>
         <a:bodyPr/>
         <a:lstStyle/>
@@ -2511,7 +2517,9 @@
     </dgm:pt>
     <dgm:pt modelId="{4EEC8717-AA0F-49DE-8732-2508B3115DE0}" type="parTrans" cxnId="{E73B190F-1347-4C04-8548-5C81DA2F643E}">
       <dgm:prSet/>
-      <dgm:spPr/>
+      <dgm:spPr>
+        <a:ln w="25400"/>
+      </dgm:spPr>
       <dgm:t>
         <a:bodyPr/>
         <a:lstStyle/>
@@ -2552,7 +2560,9 @@
     </dgm:pt>
     <dgm:pt modelId="{CEA44938-41CA-4FE2-8E9C-87D351F742D9}" type="parTrans" cxnId="{D2F302EA-F5B3-42B6-BB80-C2F47D9A3D6E}">
       <dgm:prSet/>
-      <dgm:spPr/>
+      <dgm:spPr>
+        <a:ln w="25400"/>
+      </dgm:spPr>
       <dgm:t>
         <a:bodyPr/>
         <a:lstStyle/>
@@ -3328,11 +3338,7 @@
           </a:r>
           <a:r>
             <a:rPr lang="en-US" dirty="0" smtClean="0"/>
-            <a:t> </a:t>
-          </a:r>
-          <a:r>
-            <a:rPr lang="en-US" dirty="0" smtClean="0"/>
-            <a:t>CLI</a:t>
+            <a:t> CLI</a:t>
           </a:r>
           <a:endParaRPr lang="en-US" dirty="0"/>
         </a:p>
@@ -3519,15 +3525,9 @@
           </a:pathLst>
         </a:custGeom>
         <a:noFill/>
-        <a:ln w="19050" cap="rnd" cmpd="sng" algn="ctr">
+        <a:ln w="25400" cap="rnd" cmpd="sng" algn="ctr">
           <a:solidFill>
-            <a:schemeClr val="accent1">
-              <a:shade val="60000"/>
-              <a:hueOff val="0"/>
-              <a:satOff val="0"/>
-              <a:lumOff val="0"/>
-              <a:alphaOff val="0"/>
-            </a:schemeClr>
+            <a:scrgbClr r="0" g="0" b="0"/>
           </a:solidFill>
           <a:prstDash val="solid"/>
         </a:ln>
@@ -3580,15 +3580,9 @@
           </a:pathLst>
         </a:custGeom>
         <a:noFill/>
-        <a:ln w="19050" cap="rnd" cmpd="sng" algn="ctr">
+        <a:ln w="25400" cap="rnd" cmpd="sng" algn="ctr">
           <a:solidFill>
-            <a:schemeClr val="accent1">
-              <a:shade val="60000"/>
-              <a:hueOff val="0"/>
-              <a:satOff val="0"/>
-              <a:lumOff val="0"/>
-              <a:alphaOff val="0"/>
-            </a:schemeClr>
+            <a:scrgbClr r="0" g="0" b="0"/>
           </a:solidFill>
           <a:prstDash val="solid"/>
         </a:ln>
@@ -3641,15 +3635,9 @@
           </a:pathLst>
         </a:custGeom>
         <a:noFill/>
-        <a:ln w="19050" cap="rnd" cmpd="sng" algn="ctr">
+        <a:ln w="25400" cap="rnd" cmpd="sng" algn="ctr">
           <a:solidFill>
-            <a:schemeClr val="accent1">
-              <a:shade val="60000"/>
-              <a:hueOff val="0"/>
-              <a:satOff val="0"/>
-              <a:lumOff val="0"/>
-              <a:alphaOff val="0"/>
-            </a:schemeClr>
+            <a:scrgbClr r="0" g="0" b="0"/>
           </a:solidFill>
           <a:prstDash val="solid"/>
         </a:ln>
@@ -3804,14 +3792,14 @@
             </a:spcAft>
           </a:pPr>
           <a:r>
-            <a:rPr lang="en-US" sz="2700" kern="1200" dirty="0" smtClean="0">
+            <a:rPr lang="en-US" sz="2700" b="1" kern="1200" dirty="0" smtClean="0">
               <a:solidFill>
                 <a:schemeClr val="bg1"/>
               </a:solidFill>
             </a:rPr>
             <a:t>DNX</a:t>
           </a:r>
-          <a:endParaRPr lang="en-US" sz="2700" kern="1200" dirty="0">
+          <a:endParaRPr lang="en-US" sz="2700" b="1" kern="1200" dirty="0">
             <a:solidFill>
               <a:schemeClr val="bg1"/>
             </a:solidFill>
@@ -3890,7 +3878,11 @@
           </a:pPr>
           <a:r>
             <a:rPr lang="en-US" sz="3600" kern="1200" dirty="0" smtClean="0"/>
-            <a:t>Full .NET Framework</a:t>
+            <a:t>.</a:t>
+          </a:r>
+          <a:r>
+            <a:rPr lang="en-US" sz="3600" kern="1200" dirty="0" smtClean="0"/>
+            <a:t>NET Framework</a:t>
           </a:r>
           <a:endParaRPr lang="en-US" sz="3600" kern="1200" dirty="0"/>
         </a:p>
@@ -4294,373 +4286,6 @@
       <dsp:cNvGrpSpPr/>
     </dsp:nvGrpSpPr>
     <dsp:grpSpPr/>
-    <dsp:sp modelId="{A746EB11-4E99-4B13-AEEF-24EDCB1826B8}">
-      <dsp:nvSpPr>
-        <dsp:cNvPr id="0" name=""/>
-        <dsp:cNvSpPr/>
-      </dsp:nvSpPr>
-      <dsp:spPr>
-        <a:xfrm>
-          <a:off x="1366" y="1803466"/>
-          <a:ext cx="1811734" cy="1811734"/>
-        </a:xfrm>
-        <a:prstGeom prst="ellipse">
-          <a:avLst/>
-        </a:prstGeom>
-        <a:solidFill>
-          <a:schemeClr val="accent1">
-            <a:hueOff val="0"/>
-            <a:satOff val="0"/>
-            <a:lumOff val="0"/>
-            <a:alphaOff val="0"/>
-          </a:schemeClr>
-        </a:solidFill>
-        <a:ln w="19050" cap="rnd" cmpd="sng" algn="ctr">
-          <a:solidFill>
-            <a:schemeClr val="lt1">
-              <a:hueOff val="0"/>
-              <a:satOff val="0"/>
-              <a:lumOff val="0"/>
-              <a:alphaOff val="0"/>
-            </a:schemeClr>
-          </a:solidFill>
-          <a:prstDash val="solid"/>
-        </a:ln>
-        <a:effectLst/>
-      </dsp:spPr>
-      <dsp:style>
-        <a:lnRef idx="2">
-          <a:scrgbClr r="0" g="0" b="0"/>
-        </a:lnRef>
-        <a:fillRef idx="1">
-          <a:scrgbClr r="0" g="0" b="0"/>
-        </a:fillRef>
-        <a:effectRef idx="0">
-          <a:scrgbClr r="0" g="0" b="0"/>
-        </a:effectRef>
-        <a:fontRef idx="minor">
-          <a:schemeClr val="lt1"/>
-        </a:fontRef>
-      </dsp:style>
-      <dsp:txBody>
-        <a:bodyPr spcFirstLastPara="0" vert="horz" wrap="square" lIns="25400" tIns="25400" rIns="25400" bIns="25400" numCol="1" spcCol="1270" anchor="ctr" anchorCtr="0">
-          <a:noAutofit/>
-        </a:bodyPr>
-        <a:lstStyle/>
-        <a:p>
-          <a:pPr lvl="0" algn="ctr" defTabSz="889000">
-            <a:lnSpc>
-              <a:spcPct val="90000"/>
-            </a:lnSpc>
-            <a:spcBef>
-              <a:spcPct val="0"/>
-            </a:spcBef>
-            <a:spcAft>
-              <a:spcPct val="35000"/>
-            </a:spcAft>
-          </a:pPr>
-          <a:r>
-            <a:rPr lang="en-US" sz="2000" kern="1200" dirty="0" err="1" smtClean="0"/>
-            <a:t>OmniSharp</a:t>
-          </a:r>
-          <a:endParaRPr lang="en-US" sz="2000" kern="1200" dirty="0"/>
-        </a:p>
-      </dsp:txBody>
-      <dsp:txXfrm>
-        <a:off x="266688" y="2068788"/>
-        <a:ext cx="1281090" cy="1281090"/>
-      </dsp:txXfrm>
-    </dsp:sp>
-    <dsp:sp modelId="{99021CD3-1159-400A-919E-59EF40167229}">
-      <dsp:nvSpPr>
-        <dsp:cNvPr id="0" name=""/>
-        <dsp:cNvSpPr/>
-      </dsp:nvSpPr>
-      <dsp:spPr>
-        <a:xfrm>
-          <a:off x="1960214" y="2183930"/>
-          <a:ext cx="1050805" cy="1050805"/>
-        </a:xfrm>
-        <a:prstGeom prst="mathPlus">
-          <a:avLst/>
-        </a:prstGeom>
-        <a:solidFill>
-          <a:schemeClr val="accent1">
-            <a:tint val="60000"/>
-            <a:hueOff val="0"/>
-            <a:satOff val="0"/>
-            <a:lumOff val="0"/>
-            <a:alphaOff val="0"/>
-          </a:schemeClr>
-        </a:solidFill>
-        <a:ln>
-          <a:noFill/>
-        </a:ln>
-        <a:effectLst/>
-      </dsp:spPr>
-      <dsp:style>
-        <a:lnRef idx="0">
-          <a:scrgbClr r="0" g="0" b="0"/>
-        </a:lnRef>
-        <a:fillRef idx="1">
-          <a:scrgbClr r="0" g="0" b="0"/>
-        </a:fillRef>
-        <a:effectRef idx="0">
-          <a:scrgbClr r="0" g="0" b="0"/>
-        </a:effectRef>
-        <a:fontRef idx="minor">
-          <a:schemeClr val="lt1"/>
-        </a:fontRef>
-      </dsp:style>
-      <dsp:txBody>
-        <a:bodyPr spcFirstLastPara="0" vert="horz" wrap="square" lIns="0" tIns="0" rIns="0" bIns="0" numCol="1" spcCol="1270" anchor="ctr" anchorCtr="0">
-          <a:noAutofit/>
-        </a:bodyPr>
-        <a:lstStyle/>
-        <a:p>
-          <a:pPr lvl="0" algn="ctr" defTabSz="711200">
-            <a:lnSpc>
-              <a:spcPct val="90000"/>
-            </a:lnSpc>
-            <a:spcBef>
-              <a:spcPct val="0"/>
-            </a:spcBef>
-            <a:spcAft>
-              <a:spcPct val="35000"/>
-            </a:spcAft>
-          </a:pPr>
-          <a:endParaRPr lang="en-US" sz="1600" kern="1200"/>
-        </a:p>
-      </dsp:txBody>
-      <dsp:txXfrm>
-        <a:off x="2099498" y="2585758"/>
-        <a:ext cx="772237" cy="247149"/>
-      </dsp:txXfrm>
-    </dsp:sp>
-    <dsp:sp modelId="{2BDF25E0-CBF6-4302-B6F7-03617650C5D2}">
-      <dsp:nvSpPr>
-        <dsp:cNvPr id="0" name=""/>
-        <dsp:cNvSpPr/>
-      </dsp:nvSpPr>
-      <dsp:spPr>
-        <a:xfrm>
-          <a:off x="3158132" y="1803466"/>
-          <a:ext cx="1811734" cy="1811734"/>
-        </a:xfrm>
-        <a:prstGeom prst="ellipse">
-          <a:avLst/>
-        </a:prstGeom>
-        <a:solidFill>
-          <a:schemeClr val="accent1">
-            <a:hueOff val="0"/>
-            <a:satOff val="0"/>
-            <a:lumOff val="0"/>
-            <a:alphaOff val="0"/>
-          </a:schemeClr>
-        </a:solidFill>
-        <a:ln w="19050" cap="rnd" cmpd="sng" algn="ctr">
-          <a:solidFill>
-            <a:schemeClr val="lt1">
-              <a:hueOff val="0"/>
-              <a:satOff val="0"/>
-              <a:lumOff val="0"/>
-              <a:alphaOff val="0"/>
-            </a:schemeClr>
-          </a:solidFill>
-          <a:prstDash val="solid"/>
-        </a:ln>
-        <a:effectLst/>
-      </dsp:spPr>
-      <dsp:style>
-        <a:lnRef idx="2">
-          <a:scrgbClr r="0" g="0" b="0"/>
-        </a:lnRef>
-        <a:fillRef idx="1">
-          <a:scrgbClr r="0" g="0" b="0"/>
-        </a:fillRef>
-        <a:effectRef idx="0">
-          <a:scrgbClr r="0" g="0" b="0"/>
-        </a:effectRef>
-        <a:fontRef idx="minor">
-          <a:schemeClr val="lt1"/>
-        </a:fontRef>
-      </dsp:style>
-      <dsp:txBody>
-        <a:bodyPr spcFirstLastPara="0" vert="horz" wrap="square" lIns="25400" tIns="25400" rIns="25400" bIns="25400" numCol="1" spcCol="1270" anchor="ctr" anchorCtr="0">
-          <a:noAutofit/>
-        </a:bodyPr>
-        <a:lstStyle/>
-        <a:p>
-          <a:pPr lvl="0" algn="ctr" defTabSz="889000">
-            <a:lnSpc>
-              <a:spcPct val="90000"/>
-            </a:lnSpc>
-            <a:spcBef>
-              <a:spcPct val="0"/>
-            </a:spcBef>
-            <a:spcAft>
-              <a:spcPct val="35000"/>
-            </a:spcAft>
-          </a:pPr>
-          <a:r>
-            <a:rPr lang="en-US" sz="2000" kern="1200" dirty="0" smtClean="0"/>
-            <a:t>Yeoman</a:t>
-          </a:r>
-          <a:endParaRPr lang="en-US" sz="2000" kern="1200" dirty="0"/>
-        </a:p>
-      </dsp:txBody>
-      <dsp:txXfrm>
-        <a:off x="3423454" y="2068788"/>
-        <a:ext cx="1281090" cy="1281090"/>
-      </dsp:txXfrm>
-    </dsp:sp>
-    <dsp:sp modelId="{0CEB9DC7-5783-4ACD-BCD5-4EF3BE321E8C}">
-      <dsp:nvSpPr>
-        <dsp:cNvPr id="0" name=""/>
-        <dsp:cNvSpPr/>
-      </dsp:nvSpPr>
-      <dsp:spPr>
-        <a:xfrm>
-          <a:off x="5116980" y="2183930"/>
-          <a:ext cx="1050805" cy="1050805"/>
-        </a:xfrm>
-        <a:prstGeom prst="mathEqual">
-          <a:avLst/>
-        </a:prstGeom>
-        <a:solidFill>
-          <a:schemeClr val="accent1">
-            <a:tint val="60000"/>
-            <a:hueOff val="0"/>
-            <a:satOff val="0"/>
-            <a:lumOff val="0"/>
-            <a:alphaOff val="0"/>
-          </a:schemeClr>
-        </a:solidFill>
-        <a:ln>
-          <a:noFill/>
-        </a:ln>
-        <a:effectLst/>
-      </dsp:spPr>
-      <dsp:style>
-        <a:lnRef idx="0">
-          <a:scrgbClr r="0" g="0" b="0"/>
-        </a:lnRef>
-        <a:fillRef idx="1">
-          <a:scrgbClr r="0" g="0" b="0"/>
-        </a:fillRef>
-        <a:effectRef idx="0">
-          <a:scrgbClr r="0" g="0" b="0"/>
-        </a:effectRef>
-        <a:fontRef idx="minor">
-          <a:schemeClr val="lt1"/>
-        </a:fontRef>
-      </dsp:style>
-      <dsp:txBody>
-        <a:bodyPr spcFirstLastPara="0" vert="horz" wrap="square" lIns="0" tIns="0" rIns="0" bIns="0" numCol="1" spcCol="1270" anchor="ctr" anchorCtr="0">
-          <a:noAutofit/>
-        </a:bodyPr>
-        <a:lstStyle/>
-        <a:p>
-          <a:pPr lvl="0" algn="ctr" defTabSz="711200">
-            <a:lnSpc>
-              <a:spcPct val="90000"/>
-            </a:lnSpc>
-            <a:spcBef>
-              <a:spcPct val="0"/>
-            </a:spcBef>
-            <a:spcAft>
-              <a:spcPct val="35000"/>
-            </a:spcAft>
-          </a:pPr>
-          <a:endParaRPr lang="en-US" sz="1600" kern="1200"/>
-        </a:p>
-      </dsp:txBody>
-      <dsp:txXfrm>
-        <a:off x="5256264" y="2400396"/>
-        <a:ext cx="772237" cy="617873"/>
-      </dsp:txXfrm>
-    </dsp:sp>
-    <dsp:sp modelId="{935B9248-D5AC-4608-BFDB-4CC18A641197}">
-      <dsp:nvSpPr>
-        <dsp:cNvPr id="0" name=""/>
-        <dsp:cNvSpPr/>
-      </dsp:nvSpPr>
-      <dsp:spPr>
-        <a:xfrm>
-          <a:off x="6314898" y="1803466"/>
-          <a:ext cx="1811734" cy="1811734"/>
-        </a:xfrm>
-        <a:prstGeom prst="ellipse">
-          <a:avLst/>
-        </a:prstGeom>
-        <a:solidFill>
-          <a:schemeClr val="accent1">
-            <a:hueOff val="0"/>
-            <a:satOff val="0"/>
-            <a:lumOff val="0"/>
-            <a:alphaOff val="0"/>
-          </a:schemeClr>
-        </a:solidFill>
-        <a:ln w="19050" cap="rnd" cmpd="sng" algn="ctr">
-          <a:solidFill>
-            <a:schemeClr val="lt1">
-              <a:hueOff val="0"/>
-              <a:satOff val="0"/>
-              <a:lumOff val="0"/>
-              <a:alphaOff val="0"/>
-            </a:schemeClr>
-          </a:solidFill>
-          <a:prstDash val="solid"/>
-        </a:ln>
-        <a:effectLst/>
-      </dsp:spPr>
-      <dsp:style>
-        <a:lnRef idx="2">
-          <a:scrgbClr r="0" g="0" b="0"/>
-        </a:lnRef>
-        <a:fillRef idx="1">
-          <a:scrgbClr r="0" g="0" b="0"/>
-        </a:fillRef>
-        <a:effectRef idx="0">
-          <a:scrgbClr r="0" g="0" b="0"/>
-        </a:effectRef>
-        <a:fontRef idx="minor">
-          <a:schemeClr val="lt1"/>
-        </a:fontRef>
-      </dsp:style>
-      <dsp:txBody>
-        <a:bodyPr spcFirstLastPara="0" vert="horz" wrap="square" lIns="25400" tIns="25400" rIns="25400" bIns="25400" numCol="1" spcCol="1270" anchor="ctr" anchorCtr="0">
-          <a:noAutofit/>
-        </a:bodyPr>
-        <a:lstStyle/>
-        <a:p>
-          <a:pPr lvl="0" algn="ctr" defTabSz="889000">
-            <a:lnSpc>
-              <a:spcPct val="90000"/>
-            </a:lnSpc>
-            <a:spcBef>
-              <a:spcPct val="0"/>
-            </a:spcBef>
-            <a:spcAft>
-              <a:spcPct val="35000"/>
-            </a:spcAft>
-          </a:pPr>
-          <a:r>
-            <a:rPr lang="en-US" sz="2000" kern="1200" dirty="0" smtClean="0"/>
-            <a:t>generator-</a:t>
-          </a:r>
-          <a:r>
-            <a:rPr lang="en-US" sz="2000" kern="1200" dirty="0" err="1" smtClean="0"/>
-            <a:t>aspnet</a:t>
-          </a:r>
-          <a:endParaRPr lang="en-US" sz="2000" kern="1200" dirty="0"/>
-        </a:p>
-      </dsp:txBody>
-      <dsp:txXfrm>
-        <a:off x="6580220" y="2068788"/>
-        <a:ext cx="1281090" cy="1281090"/>
-      </dsp:txXfrm>
-    </dsp:sp>
   </dsp:spTree>
 </dsp:drawing>
 </file>
@@ -4673,442 +4298,6 @@
       <dsp:cNvGrpSpPr/>
     </dsp:nvGrpSpPr>
     <dsp:grpSpPr/>
-    <dsp:sp modelId="{A1B8E387-8D9B-44C2-8C10-A0878F4BCBA5}">
-      <dsp:nvSpPr>
-        <dsp:cNvPr id="0" name=""/>
-        <dsp:cNvSpPr/>
-      </dsp:nvSpPr>
-      <dsp:spPr>
-        <a:xfrm>
-          <a:off x="1872826" y="220133"/>
-          <a:ext cx="4368800" cy="1517226"/>
-        </a:xfrm>
-        <a:prstGeom prst="ellipse">
-          <a:avLst/>
-        </a:prstGeom>
-        <a:solidFill>
-          <a:schemeClr val="accent1">
-            <a:tint val="50000"/>
-            <a:alpha val="40000"/>
-            <a:hueOff val="0"/>
-            <a:satOff val="0"/>
-            <a:lumOff val="0"/>
-            <a:alphaOff val="0"/>
-          </a:schemeClr>
-        </a:solidFill>
-        <a:ln>
-          <a:noFill/>
-        </a:ln>
-        <a:effectLst/>
-      </dsp:spPr>
-      <dsp:style>
-        <a:lnRef idx="0">
-          <a:scrgbClr r="0" g="0" b="0"/>
-        </a:lnRef>
-        <a:fillRef idx="1">
-          <a:scrgbClr r="0" g="0" b="0"/>
-        </a:fillRef>
-        <a:effectRef idx="0">
-          <a:scrgbClr r="0" g="0" b="0"/>
-        </a:effectRef>
-        <a:fontRef idx="minor"/>
-      </dsp:style>
-    </dsp:sp>
-    <dsp:sp modelId="{0E603398-1A32-447A-A475-9378CFFE704C}">
-      <dsp:nvSpPr>
-        <dsp:cNvPr id="0" name=""/>
-        <dsp:cNvSpPr/>
-      </dsp:nvSpPr>
-      <dsp:spPr>
-        <a:xfrm>
-          <a:off x="3640666" y="3935306"/>
-          <a:ext cx="846666" cy="541866"/>
-        </a:xfrm>
-        <a:prstGeom prst="downArrow">
-          <a:avLst/>
-        </a:prstGeom>
-        <a:solidFill>
-          <a:schemeClr val="accent1">
-            <a:tint val="60000"/>
-            <a:hueOff val="0"/>
-            <a:satOff val="0"/>
-            <a:lumOff val="0"/>
-            <a:alphaOff val="0"/>
-          </a:schemeClr>
-        </a:solidFill>
-        <a:ln w="19050" cap="rnd" cmpd="sng" algn="ctr">
-          <a:solidFill>
-            <a:schemeClr val="lt1">
-              <a:hueOff val="0"/>
-              <a:satOff val="0"/>
-              <a:lumOff val="0"/>
-              <a:alphaOff val="0"/>
-            </a:schemeClr>
-          </a:solidFill>
-          <a:prstDash val="solid"/>
-        </a:ln>
-        <a:effectLst/>
-      </dsp:spPr>
-      <dsp:style>
-        <a:lnRef idx="2">
-          <a:scrgbClr r="0" g="0" b="0"/>
-        </a:lnRef>
-        <a:fillRef idx="1">
-          <a:scrgbClr r="0" g="0" b="0"/>
-        </a:fillRef>
-        <a:effectRef idx="0">
-          <a:scrgbClr r="0" g="0" b="0"/>
-        </a:effectRef>
-        <a:fontRef idx="minor"/>
-      </dsp:style>
-    </dsp:sp>
-    <dsp:sp modelId="{7064439C-79BF-4007-8305-264DEF8B33A8}">
-      <dsp:nvSpPr>
-        <dsp:cNvPr id="0" name=""/>
-        <dsp:cNvSpPr/>
-      </dsp:nvSpPr>
-      <dsp:spPr>
-        <a:xfrm>
-          <a:off x="2031999" y="4368800"/>
-          <a:ext cx="4064000" cy="1016000"/>
-        </a:xfrm>
-        <a:prstGeom prst="rect">
-          <a:avLst/>
-        </a:prstGeom>
-        <a:noFill/>
-        <a:ln>
-          <a:noFill/>
-        </a:ln>
-        <a:effectLst/>
-      </dsp:spPr>
-      <dsp:style>
-        <a:lnRef idx="0">
-          <a:scrgbClr r="0" g="0" b="0"/>
-        </a:lnRef>
-        <a:fillRef idx="0">
-          <a:scrgbClr r="0" g="0" b="0"/>
-        </a:fillRef>
-        <a:effectRef idx="0">
-          <a:scrgbClr r="0" g="0" b="0"/>
-        </a:effectRef>
-        <a:fontRef idx="minor"/>
-      </dsp:style>
-      <dsp:txBody>
-        <a:bodyPr spcFirstLastPara="0" vert="horz" wrap="square" lIns="256032" tIns="256032" rIns="256032" bIns="256032" numCol="1" spcCol="1270" anchor="ctr" anchorCtr="0">
-          <a:noAutofit/>
-        </a:bodyPr>
-        <a:lstStyle/>
-        <a:p>
-          <a:pPr lvl="0" algn="ctr" defTabSz="1600200">
-            <a:lnSpc>
-              <a:spcPct val="90000"/>
-            </a:lnSpc>
-            <a:spcBef>
-              <a:spcPct val="0"/>
-            </a:spcBef>
-            <a:spcAft>
-              <a:spcPct val="35000"/>
-            </a:spcAft>
-          </a:pPr>
-          <a:r>
-            <a:rPr lang="en-US" sz="3600" kern="1200" dirty="0" err="1" smtClean="0"/>
-            <a:t>dotnet</a:t>
-          </a:r>
-          <a:r>
-            <a:rPr lang="en-US" sz="3600" kern="1200" dirty="0" smtClean="0"/>
-            <a:t> </a:t>
-          </a:r>
-          <a:r>
-            <a:rPr lang="en-US" sz="3600" kern="1200" dirty="0" smtClean="0"/>
-            <a:t>CLI</a:t>
-          </a:r>
-          <a:endParaRPr lang="en-US" sz="3600" kern="1200" dirty="0"/>
-        </a:p>
-      </dsp:txBody>
-      <dsp:txXfrm>
-        <a:off x="2031999" y="4368800"/>
-        <a:ext cx="4064000" cy="1016000"/>
-      </dsp:txXfrm>
-    </dsp:sp>
-    <dsp:sp modelId="{B19AC436-4DF8-4C08-926C-D50DB9D12085}">
-      <dsp:nvSpPr>
-        <dsp:cNvPr id="0" name=""/>
-        <dsp:cNvSpPr/>
-      </dsp:nvSpPr>
-      <dsp:spPr>
-        <a:xfrm>
-          <a:off x="3461173" y="1854538"/>
-          <a:ext cx="1524000" cy="1524000"/>
-        </a:xfrm>
-        <a:prstGeom prst="ellipse">
-          <a:avLst/>
-        </a:prstGeom>
-        <a:solidFill>
-          <a:schemeClr val="accent1">
-            <a:hueOff val="0"/>
-            <a:satOff val="0"/>
-            <a:lumOff val="0"/>
-            <a:alphaOff val="0"/>
-          </a:schemeClr>
-        </a:solidFill>
-        <a:ln w="19050" cap="rnd" cmpd="sng" algn="ctr">
-          <a:solidFill>
-            <a:schemeClr val="lt1">
-              <a:hueOff val="0"/>
-              <a:satOff val="0"/>
-              <a:lumOff val="0"/>
-              <a:alphaOff val="0"/>
-            </a:schemeClr>
-          </a:solidFill>
-          <a:prstDash val="solid"/>
-        </a:ln>
-        <a:effectLst/>
-      </dsp:spPr>
-      <dsp:style>
-        <a:lnRef idx="2">
-          <a:scrgbClr r="0" g="0" b="0"/>
-        </a:lnRef>
-        <a:fillRef idx="1">
-          <a:scrgbClr r="0" g="0" b="0"/>
-        </a:fillRef>
-        <a:effectRef idx="0">
-          <a:scrgbClr r="0" g="0" b="0"/>
-        </a:effectRef>
-        <a:fontRef idx="minor">
-          <a:schemeClr val="lt1"/>
-        </a:fontRef>
-      </dsp:style>
-      <dsp:txBody>
-        <a:bodyPr spcFirstLastPara="0" vert="horz" wrap="square" lIns="38100" tIns="38100" rIns="38100" bIns="38100" numCol="1" spcCol="1270" anchor="ctr" anchorCtr="0">
-          <a:noAutofit/>
-        </a:bodyPr>
-        <a:lstStyle/>
-        <a:p>
-          <a:pPr lvl="0" algn="ctr" defTabSz="1333500">
-            <a:lnSpc>
-              <a:spcPct val="90000"/>
-            </a:lnSpc>
-            <a:spcBef>
-              <a:spcPct val="0"/>
-            </a:spcBef>
-            <a:spcAft>
-              <a:spcPct val="35000"/>
-            </a:spcAft>
-          </a:pPr>
-          <a:r>
-            <a:rPr lang="en-US" sz="3000" kern="1200" dirty="0" smtClean="0"/>
-            <a:t>DNVM</a:t>
-          </a:r>
-          <a:endParaRPr lang="en-US" sz="3000" kern="1200" dirty="0"/>
-        </a:p>
-      </dsp:txBody>
-      <dsp:txXfrm>
-        <a:off x="3684358" y="2077723"/>
-        <a:ext cx="1077630" cy="1077630"/>
-      </dsp:txXfrm>
-    </dsp:sp>
-    <dsp:sp modelId="{8CDB8FD0-72FA-499C-B88E-4E068EA69195}">
-      <dsp:nvSpPr>
-        <dsp:cNvPr id="0" name=""/>
-        <dsp:cNvSpPr/>
-      </dsp:nvSpPr>
-      <dsp:spPr>
-        <a:xfrm>
-          <a:off x="2370666" y="711200"/>
-          <a:ext cx="1524000" cy="1524000"/>
-        </a:xfrm>
-        <a:prstGeom prst="ellipse">
-          <a:avLst/>
-        </a:prstGeom>
-        <a:solidFill>
-          <a:schemeClr val="accent1">
-            <a:hueOff val="0"/>
-            <a:satOff val="0"/>
-            <a:lumOff val="0"/>
-            <a:alphaOff val="0"/>
-          </a:schemeClr>
-        </a:solidFill>
-        <a:ln w="19050" cap="rnd" cmpd="sng" algn="ctr">
-          <a:solidFill>
-            <a:schemeClr val="lt1">
-              <a:hueOff val="0"/>
-              <a:satOff val="0"/>
-              <a:lumOff val="0"/>
-              <a:alphaOff val="0"/>
-            </a:schemeClr>
-          </a:solidFill>
-          <a:prstDash val="solid"/>
-        </a:ln>
-        <a:effectLst/>
-      </dsp:spPr>
-      <dsp:style>
-        <a:lnRef idx="2">
-          <a:scrgbClr r="0" g="0" b="0"/>
-        </a:lnRef>
-        <a:fillRef idx="1">
-          <a:scrgbClr r="0" g="0" b="0"/>
-        </a:fillRef>
-        <a:effectRef idx="0">
-          <a:scrgbClr r="0" g="0" b="0"/>
-        </a:effectRef>
-        <a:fontRef idx="minor">
-          <a:schemeClr val="lt1"/>
-        </a:fontRef>
-      </dsp:style>
-      <dsp:txBody>
-        <a:bodyPr spcFirstLastPara="0" vert="horz" wrap="square" lIns="38100" tIns="38100" rIns="38100" bIns="38100" numCol="1" spcCol="1270" anchor="ctr" anchorCtr="0">
-          <a:noAutofit/>
-        </a:bodyPr>
-        <a:lstStyle/>
-        <a:p>
-          <a:pPr lvl="0" algn="ctr" defTabSz="1333500">
-            <a:lnSpc>
-              <a:spcPct val="90000"/>
-            </a:lnSpc>
-            <a:spcBef>
-              <a:spcPct val="0"/>
-            </a:spcBef>
-            <a:spcAft>
-              <a:spcPct val="35000"/>
-            </a:spcAft>
-          </a:pPr>
-          <a:r>
-            <a:rPr lang="en-US" sz="3000" kern="1200" dirty="0" smtClean="0"/>
-            <a:t>DNX</a:t>
-          </a:r>
-          <a:endParaRPr lang="en-US" sz="3000" kern="1200" dirty="0"/>
-        </a:p>
-      </dsp:txBody>
-      <dsp:txXfrm>
-        <a:off x="2593851" y="934385"/>
-        <a:ext cx="1077630" cy="1077630"/>
-      </dsp:txXfrm>
-    </dsp:sp>
-    <dsp:sp modelId="{71F14A9E-0840-46B5-8EF7-0D0179E9C58E}">
-      <dsp:nvSpPr>
-        <dsp:cNvPr id="0" name=""/>
-        <dsp:cNvSpPr/>
-      </dsp:nvSpPr>
-      <dsp:spPr>
-        <a:xfrm>
-          <a:off x="3928533" y="342730"/>
-          <a:ext cx="1524000" cy="1524000"/>
-        </a:xfrm>
-        <a:prstGeom prst="ellipse">
-          <a:avLst/>
-        </a:prstGeom>
-        <a:solidFill>
-          <a:schemeClr val="accent1">
-            <a:hueOff val="0"/>
-            <a:satOff val="0"/>
-            <a:lumOff val="0"/>
-            <a:alphaOff val="0"/>
-          </a:schemeClr>
-        </a:solidFill>
-        <a:ln w="19050" cap="rnd" cmpd="sng" algn="ctr">
-          <a:solidFill>
-            <a:schemeClr val="lt1">
-              <a:hueOff val="0"/>
-              <a:satOff val="0"/>
-              <a:lumOff val="0"/>
-              <a:alphaOff val="0"/>
-            </a:schemeClr>
-          </a:solidFill>
-          <a:prstDash val="solid"/>
-        </a:ln>
-        <a:effectLst/>
-      </dsp:spPr>
-      <dsp:style>
-        <a:lnRef idx="2">
-          <a:scrgbClr r="0" g="0" b="0"/>
-        </a:lnRef>
-        <a:fillRef idx="1">
-          <a:scrgbClr r="0" g="0" b="0"/>
-        </a:fillRef>
-        <a:effectRef idx="0">
-          <a:scrgbClr r="0" g="0" b="0"/>
-        </a:effectRef>
-        <a:fontRef idx="minor">
-          <a:schemeClr val="lt1"/>
-        </a:fontRef>
-      </dsp:style>
-      <dsp:txBody>
-        <a:bodyPr spcFirstLastPara="0" vert="horz" wrap="square" lIns="38100" tIns="38100" rIns="38100" bIns="38100" numCol="1" spcCol="1270" anchor="ctr" anchorCtr="0">
-          <a:noAutofit/>
-        </a:bodyPr>
-        <a:lstStyle/>
-        <a:p>
-          <a:pPr lvl="0" algn="ctr" defTabSz="1333500">
-            <a:lnSpc>
-              <a:spcPct val="90000"/>
-            </a:lnSpc>
-            <a:spcBef>
-              <a:spcPct val="0"/>
-            </a:spcBef>
-            <a:spcAft>
-              <a:spcPct val="35000"/>
-            </a:spcAft>
-          </a:pPr>
-          <a:r>
-            <a:rPr lang="en-US" sz="3000" kern="1200" dirty="0" smtClean="0"/>
-            <a:t>DNU</a:t>
-          </a:r>
-          <a:endParaRPr lang="en-US" sz="3000" kern="1200" dirty="0"/>
-        </a:p>
-      </dsp:txBody>
-      <dsp:txXfrm>
-        <a:off x="4151718" y="565915"/>
-        <a:ext cx="1077630" cy="1077630"/>
-      </dsp:txXfrm>
-    </dsp:sp>
-    <dsp:sp modelId="{012112E1-3F87-4D99-A816-1C48948C5C0D}">
-      <dsp:nvSpPr>
-        <dsp:cNvPr id="0" name=""/>
-        <dsp:cNvSpPr/>
-      </dsp:nvSpPr>
-      <dsp:spPr>
-        <a:xfrm>
-          <a:off x="1693333" y="33866"/>
-          <a:ext cx="4741333" cy="3793066"/>
-        </a:xfrm>
-        <a:prstGeom prst="funnel">
-          <a:avLst/>
-        </a:prstGeom>
-        <a:solidFill>
-          <a:schemeClr val="lt1">
-            <a:alpha val="40000"/>
-            <a:hueOff val="0"/>
-            <a:satOff val="0"/>
-            <a:lumOff val="0"/>
-            <a:alphaOff val="0"/>
-          </a:schemeClr>
-        </a:solidFill>
-        <a:ln w="12700" cap="rnd" cmpd="sng" algn="ctr">
-          <a:solidFill>
-            <a:schemeClr val="accent1">
-              <a:hueOff val="0"/>
-              <a:satOff val="0"/>
-              <a:lumOff val="0"/>
-              <a:alphaOff val="0"/>
-            </a:schemeClr>
-          </a:solidFill>
-          <a:prstDash val="solid"/>
-        </a:ln>
-        <a:effectLst/>
-      </dsp:spPr>
-      <dsp:style>
-        <a:lnRef idx="1">
-          <a:scrgbClr r="0" g="0" b="0"/>
-        </a:lnRef>
-        <a:fillRef idx="1">
-          <a:scrgbClr r="0" g="0" b="0"/>
-        </a:fillRef>
-        <a:effectRef idx="0">
-          <a:scrgbClr r="0" g="0" b="0"/>
-        </a:effectRef>
-        <a:fontRef idx="minor"/>
-      </dsp:style>
-    </dsp:sp>
   </dsp:spTree>
 </dsp:drawing>
 </file>
@@ -16280,8 +15469,8 @@
           </a:prstGeom>
         </p:spPr>
       </p:pic>
-      <mc:AlternateContent xmlns:mc="http://schemas.openxmlformats.org/markup-compatibility/2006" xmlns:we="http://schemas.microsoft.com/office/webextensions/webextension/2010/11" xmlns:pca="http://schemas.microsoft.com/office/powerpoint/2013/contentapp">
-        <mc:Choice Requires="we pca">
+      <mc:AlternateContent xmlns:mc="http://schemas.openxmlformats.org/markup-compatibility/2006">
+        <mc:Choice xmlns:we="http://schemas.microsoft.com/office/webextensions/webextension/2010/11" xmlns:pca="http://schemas.microsoft.com/office/powerpoint/2013/contentapp" xmlns="" Requires="we pca">
           <p:graphicFrame>
             <p:nvGraphicFramePr>
               <p:cNvPr id="7" name="Add-in 6" title="Code Presenter Pro"/>
@@ -16307,7 +15496,7 @@
             </a:graphic>
           </p:graphicFrame>
         </mc:Choice>
-        <mc:Fallback xmlns="">
+        <mc:Fallback>
           <p:pic>
             <p:nvPicPr>
               <p:cNvPr id="7" name="Add-in 6" title="Code Presenter Pro"/>
@@ -16932,8 +16121,8 @@
           </a:p>
         </p:txBody>
       </p:sp>
-      <mc:AlternateContent xmlns:mc="http://schemas.openxmlformats.org/markup-compatibility/2006" xmlns:we="http://schemas.microsoft.com/office/webextensions/webextension/2010/11" xmlns:pca="http://schemas.microsoft.com/office/powerpoint/2013/contentapp">
-        <mc:Choice Requires="we pca">
+      <mc:AlternateContent xmlns:mc="http://schemas.openxmlformats.org/markup-compatibility/2006">
+        <mc:Choice xmlns:we="http://schemas.microsoft.com/office/webextensions/webextension/2010/11" xmlns:pca="http://schemas.microsoft.com/office/powerpoint/2013/contentapp" xmlns="" Requires="we pca">
           <p:graphicFrame>
             <p:nvGraphicFramePr>
               <p:cNvPr id="5" name="Add-in 4" title="Code Presenter Pro"/>
@@ -16959,7 +16148,7 @@
             </a:graphic>
           </p:graphicFrame>
         </mc:Choice>
-        <mc:Fallback xmlns="">
+        <mc:Fallback>
           <p:pic>
             <p:nvPicPr>
               <p:cNvPr id="5" name="Add-in 4" title="Code Presenter Pro"/>
@@ -17028,8 +16217,8 @@
           </a:p>
         </p:txBody>
       </p:sp>
-      <mc:AlternateContent xmlns:mc="http://schemas.openxmlformats.org/markup-compatibility/2006" xmlns:we="http://schemas.microsoft.com/office/webextensions/webextension/2010/11" xmlns:pca="http://schemas.microsoft.com/office/powerpoint/2013/contentapp">
-        <mc:Choice Requires="we pca">
+      <mc:AlternateContent xmlns:mc="http://schemas.openxmlformats.org/markup-compatibility/2006">
+        <mc:Choice xmlns:we="http://schemas.microsoft.com/office/webextensions/webextension/2010/11" xmlns:pca="http://schemas.microsoft.com/office/powerpoint/2013/contentapp" xmlns="" Requires="we pca">
           <p:graphicFrame>
             <p:nvGraphicFramePr>
               <p:cNvPr id="7" name="Add-in 6" title="Code Presenter Pro"/>
@@ -17055,7 +16244,7 @@
             </a:graphic>
           </p:graphicFrame>
         </mc:Choice>
-        <mc:Fallback xmlns="">
+        <mc:Fallback>
           <p:pic>
             <p:nvPicPr>
               <p:cNvPr id="7" name="Add-in 6" title="Code Presenter Pro"/>
@@ -17379,8 +16568,8 @@
           </a:p>
         </p:txBody>
       </p:sp>
-      <mc:AlternateContent xmlns:mc="http://schemas.openxmlformats.org/markup-compatibility/2006" xmlns:we="http://schemas.microsoft.com/office/webextensions/webextension/2010/11" xmlns:pca="http://schemas.microsoft.com/office/powerpoint/2013/contentapp">
-        <mc:Choice Requires="we pca">
+      <mc:AlternateContent xmlns:mc="http://schemas.openxmlformats.org/markup-compatibility/2006">
+        <mc:Choice xmlns:we="http://schemas.microsoft.com/office/webextensions/webextension/2010/11" xmlns:pca="http://schemas.microsoft.com/office/powerpoint/2013/contentapp" xmlns="" Requires="we pca">
           <p:graphicFrame>
             <p:nvGraphicFramePr>
               <p:cNvPr id="5" name="Add-in 4" title="Code Presenter Pro"/>
@@ -17406,7 +16595,7 @@
             </a:graphic>
           </p:graphicFrame>
         </mc:Choice>
-        <mc:Fallback xmlns="">
+        <mc:Fallback>
           <p:pic>
             <p:nvPicPr>
               <p:cNvPr id="5" name="Add-in 4" title="Code Presenter Pro"/>
@@ -20067,13 +19256,13 @@
             <p:ph idx="1"/>
             <p:extLst>
               <p:ext uri="{D42A27DB-BD31-4B8C-83A1-F6EECF244321}">
-                <p14:modId xmlns:p14="http://schemas.microsoft.com/office/powerpoint/2010/main" val="3120420997"/>
+                <p14:modId xmlns:p14="http://schemas.microsoft.com/office/powerpoint/2010/main" val="3818685331"/>
               </p:ext>
             </p:extLst>
           </p:nvPr>
         </p:nvGraphicFramePr>
         <p:xfrm>
-          <a:off x="677333" y="1470992"/>
+          <a:off x="677333" y="711131"/>
           <a:ext cx="8999403" cy="4050030"/>
         </p:xfrm>
         <a:graphic>
@@ -20082,111 +19271,96 @@
           </a:graphicData>
         </a:graphic>
       </p:graphicFrame>
-      <p:grpSp>
-        <p:nvGrpSpPr>
-          <p:cNvPr id="17" name="Group 16"/>
-          <p:cNvGrpSpPr/>
+      <p:pic>
+        <p:nvPicPr>
+          <p:cNvPr id="10" name="Picture 9"/>
+          <p:cNvPicPr>
+            <a:picLocks noChangeAspect="1"/>
+          </p:cNvPicPr>
           <p:nvPr/>
-        </p:nvGrpSpPr>
-        <p:grpSpPr>
+        </p:nvPicPr>
+        <p:blipFill>
+          <a:blip r:embed="rId7" cstate="print">
+            <a:extLst>
+              <a:ext uri="{28A0092B-C50C-407E-A947-70E740481C1C}">
+                <a14:useLocalDpi xmlns:a14="http://schemas.microsoft.com/office/drawing/2010/main" val="0"/>
+              </a:ext>
+            </a:extLst>
+          </a:blip>
+          <a:stretch>
+            <a:fillRect/>
+          </a:stretch>
+        </p:blipFill>
+        <p:spPr>
           <a:xfrm>
-            <a:off x="3808057" y="5339033"/>
-            <a:ext cx="2640739" cy="930986"/>
-            <a:chOff x="3808057" y="5339033"/>
-            <a:chExt cx="2640739" cy="930986"/>
+            <a:off x="3808057" y="4450382"/>
+            <a:ext cx="883851" cy="883850"/>
           </a:xfrm>
-        </p:grpSpPr>
-        <p:pic>
-          <p:nvPicPr>
-            <p:cNvPr id="10" name="Picture 9"/>
-            <p:cNvPicPr>
-              <a:picLocks noChangeAspect="1"/>
-            </p:cNvPicPr>
-            <p:nvPr/>
-          </p:nvPicPr>
-          <p:blipFill>
-            <a:blip r:embed="rId7" cstate="print">
-              <a:extLst>
-                <a:ext uri="{28A0092B-C50C-407E-A947-70E740481C1C}">
-                  <a14:useLocalDpi xmlns:a14="http://schemas.microsoft.com/office/drawing/2010/main" val="0"/>
-                </a:ext>
-              </a:extLst>
-            </a:blip>
-            <a:stretch>
-              <a:fillRect/>
-            </a:stretch>
-          </p:blipFill>
-          <p:spPr>
-            <a:xfrm>
-              <a:off x="3808057" y="5339033"/>
-              <a:ext cx="883851" cy="883850"/>
-            </a:xfrm>
-            <a:prstGeom prst="rect">
-              <a:avLst/>
-            </a:prstGeom>
-          </p:spPr>
-        </p:pic>
-        <p:pic>
-          <p:nvPicPr>
-            <p:cNvPr id="11" name="Picture 10"/>
-            <p:cNvPicPr>
-              <a:picLocks noChangeAspect="1"/>
-            </p:cNvPicPr>
-            <p:nvPr/>
-          </p:nvPicPr>
-          <p:blipFill>
-            <a:blip r:embed="rId8" cstate="print">
-              <a:extLst>
-                <a:ext uri="{28A0092B-C50C-407E-A947-70E740481C1C}">
-                  <a14:useLocalDpi xmlns:a14="http://schemas.microsoft.com/office/drawing/2010/main" val="0"/>
-                </a:ext>
-              </a:extLst>
-            </a:blip>
-            <a:stretch>
-              <a:fillRect/>
-            </a:stretch>
-          </p:blipFill>
-          <p:spPr>
-            <a:xfrm>
-              <a:off x="4789122" y="5339033"/>
-              <a:ext cx="775823" cy="930986"/>
-            </a:xfrm>
-            <a:prstGeom prst="rect">
-              <a:avLst/>
-            </a:prstGeom>
-          </p:spPr>
-        </p:pic>
-        <p:pic>
-          <p:nvPicPr>
-            <p:cNvPr id="13" name="Picture 12"/>
-            <p:cNvPicPr>
-              <a:picLocks noChangeAspect="1"/>
-            </p:cNvPicPr>
-            <p:nvPr/>
-          </p:nvPicPr>
-          <p:blipFill>
-            <a:blip r:embed="rId9" cstate="print">
-              <a:extLst>
-                <a:ext uri="{28A0092B-C50C-407E-A947-70E740481C1C}">
-                  <a14:useLocalDpi xmlns:a14="http://schemas.microsoft.com/office/drawing/2010/main" val="0"/>
-                </a:ext>
-              </a:extLst>
-            </a:blip>
-            <a:stretch>
-              <a:fillRect/>
-            </a:stretch>
-          </p:blipFill>
-          <p:spPr>
-            <a:xfrm>
-              <a:off x="5564946" y="5339033"/>
-              <a:ext cx="883850" cy="883850"/>
-            </a:xfrm>
-            <a:prstGeom prst="rect">
-              <a:avLst/>
-            </a:prstGeom>
-          </p:spPr>
-        </p:pic>
-      </p:grpSp>
+          <a:prstGeom prst="rect">
+            <a:avLst/>
+          </a:prstGeom>
+        </p:spPr>
+      </p:pic>
+      <p:pic>
+        <p:nvPicPr>
+          <p:cNvPr id="11" name="Picture 10"/>
+          <p:cNvPicPr>
+            <a:picLocks noChangeAspect="1"/>
+          </p:cNvPicPr>
+          <p:nvPr/>
+        </p:nvPicPr>
+        <p:blipFill>
+          <a:blip r:embed="rId8" cstate="print">
+            <a:extLst>
+              <a:ext uri="{28A0092B-C50C-407E-A947-70E740481C1C}">
+                <a14:useLocalDpi xmlns:a14="http://schemas.microsoft.com/office/drawing/2010/main" val="0"/>
+              </a:ext>
+            </a:extLst>
+          </a:blip>
+          <a:stretch>
+            <a:fillRect/>
+          </a:stretch>
+        </p:blipFill>
+        <p:spPr>
+          <a:xfrm>
+            <a:off x="4789122" y="4450382"/>
+            <a:ext cx="775823" cy="930986"/>
+          </a:xfrm>
+          <a:prstGeom prst="rect">
+            <a:avLst/>
+          </a:prstGeom>
+        </p:spPr>
+      </p:pic>
+      <p:pic>
+        <p:nvPicPr>
+          <p:cNvPr id="13" name="Picture 12"/>
+          <p:cNvPicPr>
+            <a:picLocks noChangeAspect="1"/>
+          </p:cNvPicPr>
+          <p:nvPr/>
+        </p:nvPicPr>
+        <p:blipFill>
+          <a:blip r:embed="rId9" cstate="print">
+            <a:extLst>
+              <a:ext uri="{28A0092B-C50C-407E-A947-70E740481C1C}">
+                <a14:useLocalDpi xmlns:a14="http://schemas.microsoft.com/office/drawing/2010/main" val="0"/>
+              </a:ext>
+            </a:extLst>
+          </a:blip>
+          <a:stretch>
+            <a:fillRect/>
+          </a:stretch>
+        </p:blipFill>
+        <p:spPr>
+          <a:xfrm>
+            <a:off x="5564946" y="4450382"/>
+            <a:ext cx="883850" cy="883850"/>
+          </a:xfrm>
+          <a:prstGeom prst="rect">
+            <a:avLst/>
+          </a:prstGeom>
+        </p:spPr>
+      </p:pic>
       <p:pic>
         <p:nvPicPr>
           <p:cNvPr id="15" name="Picture 14"/>
@@ -20209,7 +19383,7 @@
         </p:blipFill>
         <p:spPr>
           <a:xfrm>
-            <a:off x="1460090" y="5339033"/>
+            <a:off x="1460090" y="4450382"/>
             <a:ext cx="883851" cy="883850"/>
           </a:xfrm>
           <a:prstGeom prst="rect">
@@ -20217,6 +19391,470 @@
           </a:prstGeom>
         </p:spPr>
       </p:pic>
+      <p:grpSp>
+        <p:nvGrpSpPr>
+          <p:cNvPr id="12" name="Group 11"/>
+          <p:cNvGrpSpPr/>
+          <p:nvPr/>
+        </p:nvGrpSpPr>
+        <p:grpSpPr>
+          <a:xfrm>
+            <a:off x="852573" y="5819607"/>
+            <a:ext cx="2098884" cy="402484"/>
+            <a:chOff x="554686" y="3245885"/>
+            <a:chExt cx="2098884" cy="402484"/>
+          </a:xfrm>
+          <a:solidFill>
+            <a:schemeClr val="accent1"/>
+          </a:solidFill>
+        </p:grpSpPr>
+        <p:sp>
+          <p:nvSpPr>
+            <p:cNvPr id="14" name="Rectangle 13"/>
+            <p:cNvSpPr/>
+            <p:nvPr/>
+          </p:nvSpPr>
+          <p:spPr>
+            <a:xfrm>
+              <a:off x="554686" y="3245885"/>
+              <a:ext cx="2098884" cy="402484"/>
+            </a:xfrm>
+            <a:prstGeom prst="rect">
+              <a:avLst/>
+            </a:prstGeom>
+            <a:grpFill/>
+          </p:spPr>
+          <p:style>
+            <a:lnRef idx="2">
+              <a:schemeClr val="accent1">
+                <a:hueOff val="0"/>
+                <a:satOff val="0"/>
+                <a:lumOff val="0"/>
+                <a:alphaOff val="0"/>
+              </a:schemeClr>
+            </a:lnRef>
+            <a:fillRef idx="1">
+              <a:schemeClr val="lt1">
+                <a:alpha val="90000"/>
+                <a:hueOff val="0"/>
+                <a:satOff val="0"/>
+                <a:lumOff val="0"/>
+                <a:alphaOff val="0"/>
+              </a:schemeClr>
+            </a:fillRef>
+            <a:effectRef idx="0">
+              <a:schemeClr val="lt1">
+                <a:alpha val="90000"/>
+                <a:hueOff val="0"/>
+                <a:satOff val="0"/>
+                <a:lumOff val="0"/>
+                <a:alphaOff val="0"/>
+              </a:schemeClr>
+            </a:effectRef>
+            <a:fontRef idx="minor">
+              <a:schemeClr val="dk1">
+                <a:hueOff val="0"/>
+                <a:satOff val="0"/>
+                <a:lumOff val="0"/>
+                <a:alphaOff val="0"/>
+              </a:schemeClr>
+            </a:fontRef>
+          </p:style>
+        </p:sp>
+        <p:sp>
+          <p:nvSpPr>
+            <p:cNvPr id="16" name="Rectangle 15"/>
+            <p:cNvSpPr/>
+            <p:nvPr/>
+          </p:nvSpPr>
+          <p:spPr>
+            <a:xfrm>
+              <a:off x="554686" y="3245885"/>
+              <a:ext cx="2098884" cy="402484"/>
+            </a:xfrm>
+            <a:prstGeom prst="rect">
+              <a:avLst/>
+            </a:prstGeom>
+            <a:grpFill/>
+          </p:spPr>
+          <p:style>
+            <a:lnRef idx="0">
+              <a:scrgbClr r="0" g="0" b="0"/>
+            </a:lnRef>
+            <a:fillRef idx="0">
+              <a:scrgbClr r="0" g="0" b="0"/>
+            </a:fillRef>
+            <a:effectRef idx="0">
+              <a:scrgbClr r="0" g="0" b="0"/>
+            </a:effectRef>
+            <a:fontRef idx="minor">
+              <a:schemeClr val="dk1">
+                <a:hueOff val="0"/>
+                <a:satOff val="0"/>
+                <a:lumOff val="0"/>
+                <a:alphaOff val="0"/>
+              </a:schemeClr>
+            </a:fontRef>
+          </p:style>
+          <p:txBody>
+            <a:bodyPr spcFirstLastPara="0" vert="horz" wrap="square" lIns="38100" tIns="9525" rIns="38100" bIns="9525" numCol="1" spcCol="1270" anchor="ctr" anchorCtr="0">
+              <a:noAutofit/>
+            </a:bodyPr>
+            <a:lstStyle/>
+            <a:p>
+              <a:pPr lvl="0" algn="ctr" defTabSz="666750">
+                <a:lnSpc>
+                  <a:spcPct val="90000"/>
+                </a:lnSpc>
+                <a:spcBef>
+                  <a:spcPct val="0"/>
+                </a:spcBef>
+                <a:spcAft>
+                  <a:spcPct val="35000"/>
+                </a:spcAft>
+              </a:pPr>
+              <a:r>
+                <a:rPr lang="en-US" sz="2700" b="1" kern="1200" dirty="0" smtClean="0">
+                  <a:solidFill>
+                    <a:schemeClr val="bg1"/>
+                  </a:solidFill>
+                </a:rPr>
+                <a:t>IIS</a:t>
+              </a:r>
+              <a:endParaRPr lang="en-US" sz="2700" b="1" kern="1200" dirty="0">
+                <a:solidFill>
+                  <a:schemeClr val="bg1"/>
+                </a:solidFill>
+              </a:endParaRPr>
+            </a:p>
+          </p:txBody>
+        </p:sp>
+      </p:grpSp>
+      <p:grpSp>
+        <p:nvGrpSpPr>
+          <p:cNvPr id="18" name="Group 17"/>
+          <p:cNvGrpSpPr/>
+          <p:nvPr/>
+        </p:nvGrpSpPr>
+        <p:grpSpPr>
+          <a:xfrm>
+            <a:off x="3989553" y="5819607"/>
+            <a:ext cx="2098884" cy="402484"/>
+            <a:chOff x="554686" y="3245885"/>
+            <a:chExt cx="2098884" cy="402484"/>
+          </a:xfrm>
+        </p:grpSpPr>
+        <p:sp>
+          <p:nvSpPr>
+            <p:cNvPr id="19" name="Rectangle 18"/>
+            <p:cNvSpPr/>
+            <p:nvPr/>
+          </p:nvSpPr>
+          <p:spPr>
+            <a:xfrm>
+              <a:off x="554686" y="3245885"/>
+              <a:ext cx="2098884" cy="402484"/>
+            </a:xfrm>
+            <a:prstGeom prst="rect">
+              <a:avLst/>
+            </a:prstGeom>
+          </p:spPr>
+          <p:style>
+            <a:lnRef idx="2">
+              <a:schemeClr val="accent1">
+                <a:hueOff val="0"/>
+                <a:satOff val="0"/>
+                <a:lumOff val="0"/>
+                <a:alphaOff val="0"/>
+              </a:schemeClr>
+            </a:lnRef>
+            <a:fillRef idx="1">
+              <a:schemeClr val="lt1">
+                <a:alpha val="90000"/>
+                <a:hueOff val="0"/>
+                <a:satOff val="0"/>
+                <a:lumOff val="0"/>
+                <a:alphaOff val="0"/>
+              </a:schemeClr>
+            </a:fillRef>
+            <a:effectRef idx="0">
+              <a:schemeClr val="lt1">
+                <a:alpha val="90000"/>
+                <a:hueOff val="0"/>
+                <a:satOff val="0"/>
+                <a:lumOff val="0"/>
+                <a:alphaOff val="0"/>
+              </a:schemeClr>
+            </a:effectRef>
+            <a:fontRef idx="minor">
+              <a:schemeClr val="dk1">
+                <a:hueOff val="0"/>
+                <a:satOff val="0"/>
+                <a:lumOff val="0"/>
+                <a:alphaOff val="0"/>
+              </a:schemeClr>
+            </a:fontRef>
+          </p:style>
+        </p:sp>
+        <p:sp>
+          <p:nvSpPr>
+            <p:cNvPr id="20" name="Rectangle 19"/>
+            <p:cNvSpPr/>
+            <p:nvPr/>
+          </p:nvSpPr>
+          <p:spPr>
+            <a:xfrm>
+              <a:off x="554686" y="3245885"/>
+              <a:ext cx="2098884" cy="402484"/>
+            </a:xfrm>
+            <a:prstGeom prst="rect">
+              <a:avLst/>
+            </a:prstGeom>
+            <a:solidFill>
+              <a:schemeClr val="accent1"/>
+            </a:solidFill>
+          </p:spPr>
+          <p:style>
+            <a:lnRef idx="0">
+              <a:scrgbClr r="0" g="0" b="0"/>
+            </a:lnRef>
+            <a:fillRef idx="0">
+              <a:scrgbClr r="0" g="0" b="0"/>
+            </a:fillRef>
+            <a:effectRef idx="0">
+              <a:scrgbClr r="0" g="0" b="0"/>
+            </a:effectRef>
+            <a:fontRef idx="minor">
+              <a:schemeClr val="dk1">
+                <a:hueOff val="0"/>
+                <a:satOff val="0"/>
+                <a:lumOff val="0"/>
+                <a:alphaOff val="0"/>
+              </a:schemeClr>
+            </a:fontRef>
+          </p:style>
+          <p:txBody>
+            <a:bodyPr spcFirstLastPara="0" vert="horz" wrap="square" lIns="38100" tIns="9525" rIns="38100" bIns="9525" numCol="1" spcCol="1270" anchor="ctr" anchorCtr="0">
+              <a:noAutofit/>
+            </a:bodyPr>
+            <a:lstStyle/>
+            <a:p>
+              <a:pPr lvl="0" algn="ctr" defTabSz="666750">
+                <a:lnSpc>
+                  <a:spcPct val="90000"/>
+                </a:lnSpc>
+                <a:spcBef>
+                  <a:spcPct val="0"/>
+                </a:spcBef>
+                <a:spcAft>
+                  <a:spcPct val="35000"/>
+                </a:spcAft>
+              </a:pPr>
+              <a:r>
+                <a:rPr lang="en-US" sz="2700" b="1" dirty="0" smtClean="0">
+                  <a:solidFill>
+                    <a:schemeClr val="bg1"/>
+                  </a:solidFill>
+                </a:rPr>
+                <a:t>Kestrel</a:t>
+              </a:r>
+              <a:endParaRPr lang="en-US" sz="2700" b="1" kern="1200" dirty="0">
+                <a:solidFill>
+                  <a:schemeClr val="bg1"/>
+                </a:solidFill>
+              </a:endParaRPr>
+            </a:p>
+          </p:txBody>
+        </p:sp>
+      </p:grpSp>
+      <p:cxnSp>
+        <p:nvCxnSpPr>
+          <p:cNvPr id="5" name="Straight Connector 4"/>
+          <p:cNvCxnSpPr>
+            <a:stCxn id="15" idx="2"/>
+            <a:endCxn id="16" idx="0"/>
+          </p:cNvCxnSpPr>
+          <p:nvPr/>
+        </p:nvCxnSpPr>
+        <p:spPr>
+          <a:xfrm flipH="1">
+            <a:off x="1902015" y="5334232"/>
+            <a:ext cx="1" cy="485375"/>
+          </a:xfrm>
+          <a:prstGeom prst="line">
+            <a:avLst/>
+          </a:prstGeom>
+          <a:ln w="25400">
+            <a:solidFill>
+              <a:schemeClr val="tx1"/>
+            </a:solidFill>
+          </a:ln>
+        </p:spPr>
+        <p:style>
+          <a:lnRef idx="1">
+            <a:schemeClr val="accent1"/>
+          </a:lnRef>
+          <a:fillRef idx="0">
+            <a:schemeClr val="accent1"/>
+          </a:fillRef>
+          <a:effectRef idx="0">
+            <a:schemeClr val="accent1"/>
+          </a:effectRef>
+          <a:fontRef idx="minor">
+            <a:schemeClr val="tx1"/>
+          </a:fontRef>
+        </p:style>
+      </p:cxnSp>
+      <p:cxnSp>
+        <p:nvCxnSpPr>
+          <p:cNvPr id="9" name="Straight Connector 8"/>
+          <p:cNvCxnSpPr>
+            <a:stCxn id="14" idx="3"/>
+            <a:endCxn id="10" idx="2"/>
+          </p:cNvCxnSpPr>
+          <p:nvPr/>
+        </p:nvCxnSpPr>
+        <p:spPr>
+          <a:xfrm flipV="1">
+            <a:off x="2951457" y="5334232"/>
+            <a:ext cx="1298526" cy="686617"/>
+          </a:xfrm>
+          <a:prstGeom prst="line">
+            <a:avLst/>
+          </a:prstGeom>
+          <a:ln w="25400">
+            <a:solidFill>
+              <a:schemeClr val="tx1"/>
+            </a:solidFill>
+          </a:ln>
+        </p:spPr>
+        <p:style>
+          <a:lnRef idx="1">
+            <a:schemeClr val="accent1"/>
+          </a:lnRef>
+          <a:fillRef idx="0">
+            <a:schemeClr val="accent1"/>
+          </a:fillRef>
+          <a:effectRef idx="0">
+            <a:schemeClr val="accent1"/>
+          </a:effectRef>
+          <a:fontRef idx="minor">
+            <a:schemeClr val="tx1"/>
+          </a:fontRef>
+        </p:style>
+      </p:cxnSp>
+      <p:cxnSp>
+        <p:nvCxnSpPr>
+          <p:cNvPr id="27" name="Straight Connector 26"/>
+          <p:cNvCxnSpPr>
+            <a:stCxn id="10" idx="2"/>
+          </p:cNvCxnSpPr>
+          <p:nvPr/>
+        </p:nvCxnSpPr>
+        <p:spPr>
+          <a:xfrm>
+            <a:off x="4249983" y="5334232"/>
+            <a:ext cx="180349" cy="485375"/>
+          </a:xfrm>
+          <a:prstGeom prst="line">
+            <a:avLst/>
+          </a:prstGeom>
+          <a:ln w="25400">
+            <a:solidFill>
+              <a:schemeClr val="tx1"/>
+            </a:solidFill>
+          </a:ln>
+        </p:spPr>
+        <p:style>
+          <a:lnRef idx="1">
+            <a:schemeClr val="accent1"/>
+          </a:lnRef>
+          <a:fillRef idx="0">
+            <a:schemeClr val="accent1"/>
+          </a:fillRef>
+          <a:effectRef idx="0">
+            <a:schemeClr val="accent1"/>
+          </a:effectRef>
+          <a:fontRef idx="minor">
+            <a:schemeClr val="tx1"/>
+          </a:fontRef>
+        </p:style>
+      </p:cxnSp>
+      <p:cxnSp>
+        <p:nvCxnSpPr>
+          <p:cNvPr id="29" name="Straight Connector 28"/>
+          <p:cNvCxnSpPr>
+            <a:stCxn id="11" idx="2"/>
+            <a:endCxn id="20" idx="0"/>
+          </p:cNvCxnSpPr>
+          <p:nvPr/>
+        </p:nvCxnSpPr>
+        <p:spPr>
+          <a:xfrm flipH="1">
+            <a:off x="5038995" y="5381368"/>
+            <a:ext cx="138039" cy="438239"/>
+          </a:xfrm>
+          <a:prstGeom prst="line">
+            <a:avLst/>
+          </a:prstGeom>
+          <a:ln w="25400">
+            <a:solidFill>
+              <a:schemeClr val="tx1"/>
+            </a:solidFill>
+          </a:ln>
+        </p:spPr>
+        <p:style>
+          <a:lnRef idx="1">
+            <a:schemeClr val="accent1"/>
+          </a:lnRef>
+          <a:fillRef idx="0">
+            <a:schemeClr val="accent1"/>
+          </a:fillRef>
+          <a:effectRef idx="0">
+            <a:schemeClr val="accent1"/>
+          </a:effectRef>
+          <a:fontRef idx="minor">
+            <a:schemeClr val="tx1"/>
+          </a:fontRef>
+        </p:style>
+      </p:cxnSp>
+      <p:cxnSp>
+        <p:nvCxnSpPr>
+          <p:cNvPr id="31" name="Straight Connector 30"/>
+          <p:cNvCxnSpPr>
+            <a:stCxn id="13" idx="2"/>
+          </p:cNvCxnSpPr>
+          <p:nvPr/>
+        </p:nvCxnSpPr>
+        <p:spPr>
+          <a:xfrm flipH="1">
+            <a:off x="5564946" y="5334232"/>
+            <a:ext cx="441925" cy="485375"/>
+          </a:xfrm>
+          <a:prstGeom prst="line">
+            <a:avLst/>
+          </a:prstGeom>
+          <a:ln w="25400">
+            <a:solidFill>
+              <a:schemeClr val="tx1"/>
+            </a:solidFill>
+          </a:ln>
+        </p:spPr>
+        <p:style>
+          <a:lnRef idx="1">
+            <a:schemeClr val="accent1"/>
+          </a:lnRef>
+          <a:fillRef idx="0">
+            <a:schemeClr val="accent1"/>
+          </a:fillRef>
+          <a:effectRef idx="0">
+            <a:schemeClr val="accent1"/>
+          </a:effectRef>
+          <a:fontRef idx="minor">
+            <a:schemeClr val="tx1"/>
+          </a:fontRef>
+        </p:style>
+      </p:cxnSp>
     </p:spTree>
     <p:extLst>
       <p:ext uri="{BB962C8B-B14F-4D97-AF65-F5344CB8AC3E}">
@@ -21552,7 +21190,7 @@
   <a:extraClrSchemeLst/>
   <a:extLst>
     <a:ext uri="{05A4C25C-085E-4340-85A3-A5531E510DB2}">
-      <thm15:themeFamily xmlns:thm15="http://schemas.microsoft.com/office/thememl/2012/main" name="Facet" id="{C0C680CD-088A-49FC-A102-D699147F32B2}" vid="{0B5AB586-D108-4FC1-8368-649FE654B894}"/>
+      <thm15:themeFamily xmlns:thm15="http://schemas.microsoft.com/office/thememl/2012/main" xmlns="" name="Facet" id="{C0C680CD-088A-49FC-A102-D699147F32B2}" vid="{0B5AB586-D108-4FC1-8368-649FE654B894}"/>
     </a:ext>
   </a:extLst>
 </a:theme>
@@ -21813,7 +21451,7 @@
   <a:extraClrSchemeLst/>
   <a:extLst>
     <a:ext uri="{05A4C25C-085E-4340-85A3-A5531E510DB2}">
-      <thm15:themeFamily xmlns:thm15="http://schemas.microsoft.com/office/thememl/2012/main" name="Office Theme" id="{62F939B6-93AF-4DB8-9C6B-D6C7DFDC589F}" vid="{4A3C46E8-61CC-4603-A589-7422A47A8E4A}"/>
+      <thm15:themeFamily xmlns:thm15="http://schemas.microsoft.com/office/thememl/2012/main" xmlns="" name="Office Theme" id="{62F939B6-93AF-4DB8-9C6B-D6C7DFDC589F}" vid="{4A3C46E8-61CC-4603-A589-7422A47A8E4A}"/>
     </a:ext>
   </a:extLst>
 </a:theme>

</xml_diff>